<commit_message>
Changes on the Intro Slide
</commit_message>
<xml_diff>
--- a/1.Introduction.pptx
+++ b/1.Introduction.pptx
@@ -223,7 +223,7 @@
           <a:p>
             <a:fld id="{0D50C8A0-1492-41D9-9DB7-EDFB53EA040E}" type="datetimeFigureOut">
               <a:rPr lang="en-US" smtClean="0"/>
-              <a:t>5/20/2020</a:t>
+              <a:t>5/18/2021</a:t>
             </a:fld>
             <a:endParaRPr lang="en-US"/>
           </a:p>
@@ -735,7 +735,7 @@
           <a:p>
             <a:fld id="{571179DB-8C0F-4DAE-A821-BADEDABE9281}" type="datetimeFigureOut">
               <a:rPr lang="en-US" smtClean="0"/>
-              <a:t>5/20/2020</a:t>
+              <a:t>5/18/2021</a:t>
             </a:fld>
             <a:endParaRPr lang="en-US"/>
           </a:p>
@@ -933,7 +933,7 @@
           <a:p>
             <a:fld id="{571179DB-8C0F-4DAE-A821-BADEDABE9281}" type="datetimeFigureOut">
               <a:rPr lang="en-US" smtClean="0"/>
-              <a:t>5/20/2020</a:t>
+              <a:t>5/18/2021</a:t>
             </a:fld>
             <a:endParaRPr lang="en-US"/>
           </a:p>
@@ -1141,7 +1141,7 @@
           <a:p>
             <a:fld id="{571179DB-8C0F-4DAE-A821-BADEDABE9281}" type="datetimeFigureOut">
               <a:rPr lang="en-US" smtClean="0"/>
-              <a:t>5/20/2020</a:t>
+              <a:t>5/18/2021</a:t>
             </a:fld>
             <a:endParaRPr lang="en-US"/>
           </a:p>
@@ -2336,7 +2336,7 @@
           <a:p>
             <a:fld id="{571179DB-8C0F-4DAE-A821-BADEDABE9281}" type="datetimeFigureOut">
               <a:rPr lang="en-US" smtClean="0"/>
-              <a:t>5/20/2020</a:t>
+              <a:t>5/18/2021</a:t>
             </a:fld>
             <a:endParaRPr lang="en-US"/>
           </a:p>
@@ -2611,7 +2611,7 @@
           <a:p>
             <a:fld id="{571179DB-8C0F-4DAE-A821-BADEDABE9281}" type="datetimeFigureOut">
               <a:rPr lang="en-US" smtClean="0"/>
-              <a:t>5/20/2020</a:t>
+              <a:t>5/18/2021</a:t>
             </a:fld>
             <a:endParaRPr lang="en-US"/>
           </a:p>
@@ -2876,7 +2876,7 @@
           <a:p>
             <a:fld id="{571179DB-8C0F-4DAE-A821-BADEDABE9281}" type="datetimeFigureOut">
               <a:rPr lang="en-US" smtClean="0"/>
-              <a:t>5/20/2020</a:t>
+              <a:t>5/18/2021</a:t>
             </a:fld>
             <a:endParaRPr lang="en-US"/>
           </a:p>
@@ -3288,7 +3288,7 @@
           <a:p>
             <a:fld id="{571179DB-8C0F-4DAE-A821-BADEDABE9281}" type="datetimeFigureOut">
               <a:rPr lang="en-US" smtClean="0"/>
-              <a:t>5/20/2020</a:t>
+              <a:t>5/18/2021</a:t>
             </a:fld>
             <a:endParaRPr lang="en-US"/>
           </a:p>
@@ -3429,7 +3429,7 @@
           <a:p>
             <a:fld id="{571179DB-8C0F-4DAE-A821-BADEDABE9281}" type="datetimeFigureOut">
               <a:rPr lang="en-US" smtClean="0"/>
-              <a:t>5/20/2020</a:t>
+              <a:t>5/18/2021</a:t>
             </a:fld>
             <a:endParaRPr lang="en-US"/>
           </a:p>
@@ -3542,7 +3542,7 @@
           <a:p>
             <a:fld id="{571179DB-8C0F-4DAE-A821-BADEDABE9281}" type="datetimeFigureOut">
               <a:rPr lang="en-US" smtClean="0"/>
-              <a:t>5/20/2020</a:t>
+              <a:t>5/18/2021</a:t>
             </a:fld>
             <a:endParaRPr lang="en-US"/>
           </a:p>
@@ -3853,7 +3853,7 @@
           <a:p>
             <a:fld id="{571179DB-8C0F-4DAE-A821-BADEDABE9281}" type="datetimeFigureOut">
               <a:rPr lang="en-US" smtClean="0"/>
-              <a:t>5/20/2020</a:t>
+              <a:t>5/18/2021</a:t>
             </a:fld>
             <a:endParaRPr lang="en-US"/>
           </a:p>
@@ -4141,7 +4141,7 @@
           <a:p>
             <a:fld id="{571179DB-8C0F-4DAE-A821-BADEDABE9281}" type="datetimeFigureOut">
               <a:rPr lang="en-US" smtClean="0"/>
-              <a:t>5/20/2020</a:t>
+              <a:t>5/18/2021</a:t>
             </a:fld>
             <a:endParaRPr lang="en-US"/>
           </a:p>
@@ -4382,7 +4382,7 @@
           <a:p>
             <a:fld id="{571179DB-8C0F-4DAE-A821-BADEDABE9281}" type="datetimeFigureOut">
               <a:rPr lang="en-US" smtClean="0"/>
-              <a:t>5/20/2020</a:t>
+              <a:t>5/18/2021</a:t>
             </a:fld>
             <a:endParaRPr lang="en-US"/>
           </a:p>
@@ -4835,7 +4835,7 @@
           <a:p>
             <a:r>
               <a:rPr lang="en-US" sz="5400" b="1" dirty="0"/>
-              <a:t>Internship, 2020</a:t>
+              <a:t>Internship, 2021</a:t>
             </a:r>
           </a:p>
         </p:txBody>
@@ -5297,7 +5297,7 @@
                 <a:latin typeface="Segoe UI Light" pitchFamily="34" charset="0"/>
                 <a:cs typeface="Segoe UI" pitchFamily="34" charset="0"/>
               </a:rPr>
-              <a:t>Garage India Internship 2020</a:t>
+              <a:t>Garage India Internship 2021</a:t>
             </a:r>
           </a:p>
           <a:p>
@@ -5352,7 +5352,7 @@
       </p:grpSpPr>
       <p:pic>
         <p:nvPicPr>
-          <p:cNvPr id="9" name="Picture 8" descr="A person wearing glasses and smiling at the camera&#10;&#10;Description automatically generated">
+          <p:cNvPr id="9" name="Picture 8">
             <a:extLst>
               <a:ext uri="{FF2B5EF4-FFF2-40B4-BE49-F238E27FC236}">
                 <a16:creationId xmlns:a16="http://schemas.microsoft.com/office/drawing/2014/main" id="{8FB0904F-62DA-4639-A200-DCE5B05F2F5D}"/>
@@ -5372,14 +5372,13 @@
               </a:ext>
             </a:extLst>
           </a:blip>
-          <a:stretch>
-            <a:fillRect/>
-          </a:stretch>
+          <a:srcRect/>
+          <a:stretch/>
         </p:blipFill>
         <p:spPr>
           <a:xfrm>
-            <a:off x="1212979" y="1827276"/>
-            <a:ext cx="2413518" cy="2363694"/>
+            <a:off x="1040560" y="1352939"/>
+            <a:ext cx="2774982" cy="4926460"/>
           </a:xfrm>
           <a:prstGeom prst="rect">
             <a:avLst/>
@@ -5401,7 +5400,7 @@
         <p:spPr>
           <a:xfrm>
             <a:off x="4702629" y="1352939"/>
-            <a:ext cx="6276392" cy="4247317"/>
+            <a:ext cx="6276392" cy="5355312"/>
           </a:xfrm>
           <a:prstGeom prst="rect">
             <a:avLst/>
@@ -5441,49 +5440,95 @@
           <a:p>
             <a:r>
               <a:rPr lang="en-US" dirty="0"/>
-              <a:t>Technical Program Lead</a:t>
+              <a:t>ML Spokes person at Byteridge, </a:t>
             </a:r>
           </a:p>
           <a:p>
             <a:r>
               <a:rPr lang="en-US" dirty="0"/>
-              <a:t>Byteridge Software PVT LTD</a:t>
+              <a:t>Working with Microsoft for 6 years for now on various</a:t>
             </a:r>
           </a:p>
           <a:p>
             <a:endParaRPr lang="en-US" dirty="0"/>
           </a:p>
           <a:p>
+            <a:pPr marL="0" indent="0">
+              <a:buNone/>
+            </a:pPr>
+            <a:r>
+              <a:rPr lang="en-US" sz="1800" b="0" i="1" dirty="0">
+                <a:effectLst/>
+                <a:latin typeface="Roboto Light" panose="02000000000000000000"/>
+              </a:rPr>
+              <a:t>A Data Science Engineer and Mentor. Extensive experience of working in Artificial Intelligence and cloud frameworks.</a:t>
+            </a:r>
+          </a:p>
+          <a:p>
+            <a:pPr marL="0" indent="0">
+              <a:buNone/>
+            </a:pPr>
+            <a:r>
+              <a:rPr lang="en-US" sz="1800" b="0" i="1" dirty="0">
+                <a:effectLst/>
+                <a:latin typeface="Roboto Light" panose="02000000000000000000"/>
+              </a:rPr>
+              <a:t>Spoke at various premium intuitions </a:t>
+            </a:r>
+            <a:r>
+              <a:rPr lang="en-US" sz="1800" i="1" dirty="0">
+                <a:latin typeface="Roboto Light" panose="02000000000000000000"/>
+              </a:rPr>
+              <a:t>of </a:t>
+            </a:r>
+            <a:r>
+              <a:rPr lang="en-US" sz="1800" b="0" i="1" dirty="0">
+                <a:effectLst/>
+                <a:latin typeface="Roboto Light" panose="02000000000000000000"/>
+              </a:rPr>
+              <a:t>India like IITs, NITs, .. </a:t>
+            </a:r>
+            <a:r>
+              <a:rPr lang="en-US" sz="1800" b="0" i="1" dirty="0" err="1">
+                <a:effectLst/>
+                <a:latin typeface="Roboto Light" panose="02000000000000000000"/>
+              </a:rPr>
+              <a:t>etc</a:t>
+            </a:r>
+            <a:r>
+              <a:rPr lang="en-US" sz="1800" b="0" i="1" dirty="0">
+                <a:effectLst/>
+                <a:latin typeface="Roboto Light" panose="02000000000000000000"/>
+              </a:rPr>
+              <a:t> on behalf of Microsoft</a:t>
+            </a:r>
+          </a:p>
+          <a:p>
+            <a:pPr marL="0" indent="0">
+              <a:buNone/>
+            </a:pPr>
+            <a:endParaRPr lang="en-US" sz="1800" b="0" i="1" dirty="0">
+              <a:effectLst/>
+              <a:latin typeface="Roboto Light" panose="02000000000000000000"/>
+            </a:endParaRPr>
+          </a:p>
+          <a:p>
+            <a:pPr marL="0" indent="0">
+              <a:buNone/>
+            </a:pPr>
+            <a:r>
+              <a:rPr lang="en-US" sz="1800" b="0" i="1" dirty="0">
+                <a:effectLst/>
+                <a:latin typeface="Roboto Light" panose="02000000000000000000"/>
+              </a:rPr>
+              <a:t>My research work involves in Text summarization and summarization for multiple documents and research papers</a:t>
+            </a:r>
+          </a:p>
+          <a:p>
             <a:endParaRPr lang="en-US" dirty="0"/>
           </a:p>
           <a:p>
-            <a:r>
-              <a:rPr lang="en-US" dirty="0"/>
-              <a:t>ML Spokes person at Byteridge, </a:t>
-            </a:r>
-          </a:p>
-          <a:p>
-            <a:r>
-              <a:rPr lang="en-US" dirty="0"/>
-              <a:t>Working with Microsoft for 5 years for now on various</a:t>
-            </a:r>
-          </a:p>
-          <a:p>
             <a:endParaRPr lang="en-US" dirty="0"/>
-          </a:p>
-          <a:p>
-            <a:r>
-              <a:rPr lang="en-US" dirty="0"/>
-              <a:t>Aka.ms/</a:t>
-            </a:r>
-            <a:r>
-              <a:rPr lang="en-US" dirty="0" err="1"/>
-              <a:t>Garagebot</a:t>
-            </a:r>
-            <a:r>
-              <a:rPr lang="en-US" dirty="0"/>
-              <a:t> </a:t>
-            </a:r>
           </a:p>
           <a:p>
             <a:endParaRPr lang="en-US" dirty="0"/>
@@ -5587,31 +5632,7 @@
           <a:p>
             <a:r>
               <a:rPr lang="en-IN" dirty="0"/>
-              <a:t>Speakers – Vinayak, Trilok, Prakash, </a:t>
-            </a:r>
-            <a:r>
-              <a:rPr lang="en-IN" dirty="0" err="1"/>
-              <a:t>Sravani</a:t>
-            </a:r>
-            <a:r>
-              <a:rPr lang="en-IN" dirty="0"/>
-              <a:t>, </a:t>
-            </a:r>
-            <a:r>
-              <a:rPr lang="en-IN" dirty="0" err="1"/>
-              <a:t>Santhan</a:t>
-            </a:r>
-            <a:r>
-              <a:rPr lang="en-IN" dirty="0"/>
-              <a:t>, Mrinal,  </a:t>
-            </a:r>
-            <a:r>
-              <a:rPr lang="en-IN" dirty="0" err="1"/>
-              <a:t>Saiteja</a:t>
-            </a:r>
-            <a:r>
-              <a:rPr lang="en-IN" dirty="0"/>
-              <a:t>, Surya, Satish, Manjunath, Jeetendra Pandey and Sanjeev’s Team</a:t>
+              <a:t>Speakers – Vinayak, Trilok, Sandeep, Babji, Dhruv</a:t>
             </a:r>
           </a:p>
           <a:p>
@@ -5661,7 +5682,7 @@
         </p:nvSpPr>
         <p:spPr>
           <a:xfrm>
-            <a:off x="1" y="1371601"/>
+            <a:off x="1054361" y="2845839"/>
             <a:ext cx="3916392" cy="788793"/>
           </a:xfrm>
         </p:spPr>
@@ -5676,7 +5697,7 @@
             </a:pPr>
             <a:r>
               <a:rPr lang="en-US" sz="1800" dirty="0"/>
-              <a:t>Carbon Dashboard</a:t>
+              <a:t>Task Management Systems</a:t>
             </a:r>
           </a:p>
         </p:txBody>
@@ -5733,7 +5754,7 @@
         </p:nvSpPr>
         <p:spPr>
           <a:xfrm>
-            <a:off x="4109124" y="1371600"/>
+            <a:off x="7122912" y="2845837"/>
             <a:ext cx="3809925" cy="788795"/>
           </a:xfrm>
         </p:spPr>
@@ -5747,271 +5768,12 @@
               <a:buNone/>
             </a:pPr>
             <a:r>
-              <a:rPr lang="en-US" sz="1800" dirty="0"/>
-              <a:t>Operational Evolution and Sustainability Based on Megatrends</a:t>
-            </a:r>
-            <a:endParaRPr lang="fr-FR" sz="1800" dirty="0"/>
-          </a:p>
-        </p:txBody>
-      </p:sp>
-      <p:sp>
-        <p:nvSpPr>
-          <p:cNvPr id="11" name="Content Placeholder 1"/>
-          <p:cNvSpPr>
-            <a:spLocks noGrp="1"/>
-          </p:cNvSpPr>
-          <p:nvPr>
-            <p:ph sz="half" idx="2"/>
-          </p:nvPr>
-        </p:nvSpPr>
-        <p:spPr>
-          <a:xfrm>
-            <a:off x="354389" y="4165872"/>
-            <a:ext cx="3629781" cy="1133915"/>
-          </a:xfrm>
-        </p:spPr>
-        <p:txBody>
-          <a:bodyPr>
-            <a:normAutofit/>
-          </a:bodyPr>
-          <a:lstStyle/>
-          <a:p>
-            <a:pPr marL="0" indent="0" algn="ctr">
-              <a:buNone/>
-            </a:pPr>
-            <a:r>
-              <a:rPr lang="en-US" sz="1800" dirty="0"/>
-              <a:t>Excel powered platform for making customized Cashflow Management Apps for mobile first Small Business customers</a:t>
-            </a:r>
-            <a:endParaRPr lang="en-IN" sz="1200" dirty="0"/>
-          </a:p>
-        </p:txBody>
-      </p:sp>
-      <p:sp>
-        <p:nvSpPr>
-          <p:cNvPr id="12" name="Content Placeholder 1"/>
-          <p:cNvSpPr>
-            <a:spLocks noGrp="1"/>
-          </p:cNvSpPr>
-          <p:nvPr>
-            <p:ph sz="half" idx="2"/>
-          </p:nvPr>
-        </p:nvSpPr>
-        <p:spPr>
-          <a:xfrm>
-            <a:off x="379511" y="2800139"/>
-            <a:ext cx="3283113" cy="788795"/>
-          </a:xfrm>
-        </p:spPr>
-        <p:txBody>
-          <a:bodyPr>
-            <a:normAutofit/>
-          </a:bodyPr>
-          <a:lstStyle/>
-          <a:p>
-            <a:pPr marL="0" indent="0" algn="ctr">
-              <a:buNone/>
-            </a:pPr>
-            <a:r>
-              <a:rPr lang="en-US" sz="1800" dirty="0"/>
-              <a:t>Organization News in Teams</a:t>
-            </a:r>
-            <a:endParaRPr lang="en-IN" sz="1200" dirty="0"/>
-          </a:p>
-        </p:txBody>
-      </p:sp>
-      <p:sp>
-        <p:nvSpPr>
-          <p:cNvPr id="13" name="Content Placeholder 1"/>
-          <p:cNvSpPr>
-            <a:spLocks noGrp="1"/>
-          </p:cNvSpPr>
-          <p:nvPr>
-            <p:ph sz="half" idx="2"/>
-          </p:nvPr>
-        </p:nvSpPr>
-        <p:spPr>
-          <a:xfrm>
-            <a:off x="4109123" y="2800138"/>
-            <a:ext cx="3283113" cy="788795"/>
-          </a:xfrm>
-        </p:spPr>
-        <p:txBody>
-          <a:bodyPr>
-            <a:normAutofit/>
-          </a:bodyPr>
-          <a:lstStyle/>
-          <a:p>
-            <a:pPr marL="0" indent="0" algn="ctr">
-              <a:buNone/>
-            </a:pPr>
-            <a:r>
-              <a:rPr lang="en-IN" sz="1800" dirty="0"/>
-              <a:t>PDF Reflow</a:t>
-            </a:r>
-            <a:endParaRPr lang="en-IN" sz="1200" dirty="0"/>
-          </a:p>
-        </p:txBody>
-      </p:sp>
-      <p:sp>
-        <p:nvSpPr>
-          <p:cNvPr id="14" name="Content Placeholder 1"/>
-          <p:cNvSpPr>
-            <a:spLocks noGrp="1"/>
-          </p:cNvSpPr>
-          <p:nvPr>
-            <p:ph sz="half" idx="2"/>
-          </p:nvPr>
-        </p:nvSpPr>
-        <p:spPr>
-          <a:xfrm>
-            <a:off x="8130139" y="2800138"/>
-            <a:ext cx="3283113" cy="788795"/>
-          </a:xfrm>
-        </p:spPr>
-        <p:txBody>
-          <a:bodyPr>
-            <a:normAutofit/>
-          </a:bodyPr>
-          <a:lstStyle/>
-          <a:p>
-            <a:pPr marL="0" indent="0" algn="ctr">
-              <a:buNone/>
-            </a:pPr>
-            <a:r>
-              <a:rPr lang="en-US" sz="1800" dirty="0"/>
-              <a:t>Teams for EDU - differentiated experience</a:t>
-            </a:r>
-            <a:endParaRPr lang="en-IN" sz="1200" dirty="0"/>
-          </a:p>
-        </p:txBody>
-      </p:sp>
-      <p:sp>
-        <p:nvSpPr>
-          <p:cNvPr id="15" name="Content Placeholder 1"/>
-          <p:cNvSpPr>
-            <a:spLocks noGrp="1"/>
-          </p:cNvSpPr>
-          <p:nvPr>
-            <p:ph sz="half" idx="2"/>
-          </p:nvPr>
-        </p:nvSpPr>
-        <p:spPr>
-          <a:xfrm>
-            <a:off x="7996336" y="1392172"/>
-            <a:ext cx="3694922" cy="1063487"/>
-          </a:xfrm>
-        </p:spPr>
-        <p:txBody>
-          <a:bodyPr>
-            <a:normAutofit lnSpcReduction="10000"/>
-          </a:bodyPr>
-          <a:lstStyle/>
-          <a:p>
-            <a:pPr marL="0" indent="0" algn="ctr">
-              <a:buNone/>
-            </a:pPr>
-            <a:r>
-              <a:rPr lang="en-US" sz="1800" dirty="0"/>
-              <a:t>Media sharing in Microsoft Teams mobile app: Best-in class video and image sharing platform for modern users.</a:t>
-            </a:r>
-            <a:endParaRPr lang="en-IN" sz="1200" dirty="0"/>
-          </a:p>
-        </p:txBody>
-      </p:sp>
-      <p:sp>
-        <p:nvSpPr>
-          <p:cNvPr id="16" name="Content Placeholder 1"/>
-          <p:cNvSpPr>
-            <a:spLocks noGrp="1"/>
-          </p:cNvSpPr>
-          <p:nvPr>
-            <p:ph sz="half" idx="2"/>
-          </p:nvPr>
-        </p:nvSpPr>
-        <p:spPr>
-          <a:xfrm>
-            <a:off x="4174438" y="4228677"/>
-            <a:ext cx="3283113" cy="788795"/>
-          </a:xfrm>
-        </p:spPr>
-        <p:txBody>
-          <a:bodyPr>
-            <a:normAutofit/>
-          </a:bodyPr>
-          <a:lstStyle/>
-          <a:p>
-            <a:pPr marL="0" indent="0" algn="ctr">
-              <a:buNone/>
-            </a:pPr>
-            <a:r>
-              <a:rPr lang="en-IN" sz="1800" dirty="0"/>
-              <a:t>Skill based LU</a:t>
-            </a:r>
-          </a:p>
-        </p:txBody>
-      </p:sp>
-      <p:sp>
-        <p:nvSpPr>
-          <p:cNvPr id="17" name="Content Placeholder 1"/>
-          <p:cNvSpPr>
-            <a:spLocks noGrp="1"/>
-          </p:cNvSpPr>
-          <p:nvPr>
-            <p:ph sz="half" idx="2"/>
-          </p:nvPr>
-        </p:nvSpPr>
-        <p:spPr>
-          <a:xfrm>
-            <a:off x="8130138" y="4228678"/>
-            <a:ext cx="3561120" cy="1071110"/>
-          </a:xfrm>
-        </p:spPr>
-        <p:txBody>
-          <a:bodyPr>
-            <a:normAutofit lnSpcReduction="10000"/>
-          </a:bodyPr>
-          <a:lstStyle/>
-          <a:p>
-            <a:pPr marL="0" indent="0" algn="ctr">
-              <a:buNone/>
-            </a:pPr>
-            <a:r>
-              <a:rPr lang="en-US" sz="1800" dirty="0"/>
-              <a:t>Multi-Platform User Interface for Mixed and Virtual Reality App to Visualize and Simulate Quantum Computing</a:t>
-            </a:r>
-            <a:endParaRPr lang="en-IN" sz="1200" dirty="0"/>
-          </a:p>
-        </p:txBody>
-      </p:sp>
-      <p:sp>
-        <p:nvSpPr>
-          <p:cNvPr id="18" name="Content Placeholder 1"/>
-          <p:cNvSpPr>
-            <a:spLocks noGrp="1"/>
-          </p:cNvSpPr>
-          <p:nvPr>
-            <p:ph sz="half" idx="2"/>
-          </p:nvPr>
-        </p:nvSpPr>
-        <p:spPr>
-          <a:xfrm>
-            <a:off x="4174437" y="5657215"/>
-            <a:ext cx="3283113" cy="788795"/>
-          </a:xfrm>
-        </p:spPr>
-        <p:txBody>
-          <a:bodyPr>
-            <a:normAutofit/>
-          </a:bodyPr>
-          <a:lstStyle/>
-          <a:p>
-            <a:pPr marL="0" indent="0" algn="ctr">
-              <a:buNone/>
-            </a:pPr>
-            <a:r>
-              <a:rPr lang="en-US" sz="1800" dirty="0"/>
-              <a:t>Outlook on Jio Phone</a:t>
+              <a:rPr lang="fr-FR" sz="1800" dirty="0" err="1"/>
+              <a:t>Fraud</a:t>
+            </a:r>
+            <a:r>
+              <a:rPr lang="fr-FR" sz="1800" dirty="0"/>
+              <a:t> Linkage Analyzer</a:t>
             </a:r>
           </a:p>
         </p:txBody>
@@ -6143,7 +5905,12 @@
             <p:ph type="title"/>
           </p:nvPr>
         </p:nvSpPr>
-        <p:spPr/>
+        <p:spPr>
+          <a:xfrm>
+            <a:off x="379514" y="0"/>
+            <a:ext cx="10515600" cy="1325563"/>
+          </a:xfrm>
+        </p:spPr>
         <p:txBody>
           <a:bodyPr/>
           <a:lstStyle/>
@@ -6196,6 +5963,13 @@
           </a:p>
           <a:p>
             <a:r>
+              <a:rPr lang="en-IN" sz="1400" b="1" dirty="0"/>
+              <a:t>Lunch (13:00 – 14:00)</a:t>
+            </a:r>
+            <a:endParaRPr lang="en-IN" sz="1400" dirty="0"/>
+          </a:p>
+          <a:p>
+            <a:r>
               <a:rPr lang="en-IN" sz="1400" dirty="0" err="1"/>
               <a:t>.Net</a:t>
             </a:r>
@@ -6206,14 +5980,8 @@
           </a:p>
           <a:p>
             <a:r>
-              <a:rPr lang="en-IN" sz="1400" b="1" dirty="0"/>
-              <a:t>Lunch (13:00 – 14:00)</a:t>
-            </a:r>
-          </a:p>
-          <a:p>
-            <a:r>
               <a:rPr lang="en-IN" sz="1400" dirty="0"/>
-              <a:t>Web API, Sample</a:t>
+              <a:t>Web development</a:t>
             </a:r>
           </a:p>
           <a:p>
@@ -6224,14 +5992,8 @@
           </a:p>
           <a:p>
             <a:r>
-              <a:rPr lang="en-IN" sz="1400" dirty="0"/>
-              <a:t>Node, Express, Mongo</a:t>
-            </a:r>
-          </a:p>
-          <a:p>
-            <a:r>
               <a:rPr lang="en-IN" sz="1400" b="1" dirty="0"/>
-              <a:t>Day end (17:00)</a:t>
+              <a:t>Day end (18:00)</a:t>
             </a:r>
           </a:p>
         </p:txBody>
@@ -6413,12 +6175,7 @@
               <a:rPr lang="en-IN" sz="1800" dirty="0"/>
               <a:t>– Start 10:00</a:t>
             </a:r>
-          </a:p>
-          <a:p>
-            <a:r>
-              <a:rPr lang="en-IN" sz="1400" dirty="0"/>
-              <a:t>Android Programming</a:t>
-            </a:r>
+            <a:endParaRPr lang="en-IN" sz="1400" dirty="0"/>
           </a:p>
           <a:p>
             <a:r>
@@ -6428,9 +6185,10 @@
           </a:p>
           <a:p>
             <a:r>
-              <a:rPr lang="en-IN" sz="1400" dirty="0"/>
-              <a:t>Quantum Basics</a:t>
-            </a:r>
+              <a:rPr lang="en-IN" sz="1400" dirty="0" err="1"/>
+              <a:t>QnA</a:t>
+            </a:r>
+            <a:endParaRPr lang="en-IN" sz="1400" dirty="0"/>
           </a:p>
           <a:p>
             <a:r>
@@ -6447,25 +6205,19 @@
           <a:p>
             <a:r>
               <a:rPr lang="en-IN" sz="1400" dirty="0"/>
-              <a:t>Azure Data factory</a:t>
+              <a:t>AAD</a:t>
             </a:r>
           </a:p>
           <a:p>
             <a:r>
               <a:rPr lang="en-IN" sz="1400" dirty="0"/>
-              <a:t>Azure Data Lake</a:t>
-            </a:r>
-          </a:p>
-          <a:p>
-            <a:r>
-              <a:rPr lang="en-IN" sz="1400" dirty="0"/>
-              <a:t>Azure Databricks</a:t>
+              <a:t>Azure Cosmos DB</a:t>
             </a:r>
           </a:p>
           <a:p>
             <a:r>
               <a:rPr lang="en-IN" sz="1400" b="1" dirty="0"/>
-              <a:t>Day end (17:30)</a:t>
+              <a:t>Day end (18:00)</a:t>
             </a:r>
           </a:p>
         </p:txBody>
@@ -6655,38 +6407,47 @@
           <a:p>
             <a:r>
               <a:rPr lang="en-IN" sz="1400" dirty="0"/>
-              <a:t>React Native</a:t>
+              <a:t>Browser Extension Development</a:t>
             </a:r>
           </a:p>
           <a:p>
             <a:r>
               <a:rPr lang="en-IN" sz="1400" dirty="0"/>
-              <a:t>Power BI</a:t>
+              <a:t>Intro to ML</a:t>
             </a:r>
           </a:p>
           <a:p>
             <a:r>
               <a:rPr lang="en-IN" sz="1400" dirty="0"/>
-              <a:t>Basic ML and DL</a:t>
+              <a:t>Intro to Azure ML</a:t>
             </a:r>
           </a:p>
           <a:p>
             <a:r>
               <a:rPr lang="en-IN" sz="1400" b="1" dirty="0"/>
-              <a:t>Lunch (12:30 – 14:00)</a:t>
+              <a:t>Lunch (13:00 – 14:00)</a:t>
             </a:r>
           </a:p>
           <a:p>
             <a:r>
               <a:rPr lang="en-IN" sz="1400" dirty="0"/>
-              <a:t>Time series, LSTM, ARIMA</a:t>
-            </a:r>
-          </a:p>
-          <a:p>
+              <a:t>Fraud Detection Case study(2:30pm)</a:t>
+            </a:r>
+          </a:p>
+          <a:p>
+            <a:r>
+              <a:rPr lang="en-IN" sz="1400" dirty="0" err="1"/>
+              <a:t>QnA</a:t>
+            </a:r>
             <a:r>
               <a:rPr lang="en-IN" sz="1400" dirty="0"/>
-              <a:t>Quantum - Advanced</a:t>
-            </a:r>
+              <a:t> &amp; </a:t>
+            </a:r>
+            <a:r>
+              <a:rPr lang="en-IN" sz="1400" dirty="0" err="1"/>
+              <a:t>Socilize</a:t>
+            </a:r>
+            <a:endParaRPr lang="en-IN" sz="1400" dirty="0"/>
           </a:p>
           <a:p>
             <a:r>
@@ -6783,7 +6544,7 @@
             <a:pPr algn="ctr"/>
             <a:r>
               <a:rPr lang="en-IN" dirty="0"/>
-              <a:t>The Garage India Internship Projects Projects</a:t>
+              <a:t>The Garage India Internship Projects</a:t>
             </a:r>
           </a:p>
         </p:txBody>

</xml_diff>